<commit_message>
pushing last changes from summer course
</commit_message>
<xml_diff>
--- a/chapter_06/lecture_09.pptx
+++ b/chapter_06/lecture_09.pptx
@@ -17571,23 +17571,7 @@
                   <a:srgbClr val="999988"/>
                 </a:solidFill>
               </a:rPr>
-              <a:t>// </a:t>
-            </a:r>
-            <a:r>
-              <a:rPr lang="en-US" i="1">
-                <a:solidFill>
-                  <a:srgbClr val="999988"/>
-                </a:solidFill>
-              </a:rPr>
-              <a:t>calls 	screen</a:t>
-            </a:r>
-            <a:r>
-              <a:rPr lang="en-US" i="1" dirty="0">
-                <a:solidFill>
-                  <a:srgbClr val="999988"/>
-                </a:solidFill>
-              </a:rPr>
-              <a:t>(</a:t>
+              <a:t>// calls 	screen(</a:t>
             </a:r>
             <a:r>
               <a:rPr lang="en-US" i="1" dirty="0" err="1">
@@ -17974,6 +17958,445 @@
                       </p:childTnLst>
                     </p:cTn>
                   </p:par>
+                  <p:par>
+                    <p:cTn id="9" fill="hold">
+                      <p:stCondLst>
+                        <p:cond delay="indefinite"/>
+                      </p:stCondLst>
+                      <p:childTnLst>
+                        <p:par>
+                          <p:cTn id="10" fill="hold">
+                            <p:stCondLst>
+                              <p:cond delay="0"/>
+                            </p:stCondLst>
+                            <p:childTnLst>
+                              <p:par>
+                                <p:cTn id="11" presetID="1" presetClass="entr" presetSubtype="0" fill="hold" nodeType="clickEffect">
+                                  <p:stCondLst>
+                                    <p:cond delay="0"/>
+                                  </p:stCondLst>
+                                  <p:childTnLst>
+                                    <p:set>
+                                      <p:cBhvr>
+                                        <p:cTn id="12" dur="1" fill="hold">
+                                          <p:stCondLst>
+                                            <p:cond delay="0"/>
+                                          </p:stCondLst>
+                                        </p:cTn>
+                                        <p:tgtEl>
+                                          <p:spTgt spid="4">
+                                            <p:txEl>
+                                              <p:pRg st="0" end="0"/>
+                                            </p:txEl>
+                                          </p:spTgt>
+                                        </p:tgtEl>
+                                        <p:attrNameLst>
+                                          <p:attrName>style.visibility</p:attrName>
+                                        </p:attrNameLst>
+                                      </p:cBhvr>
+                                      <p:to>
+                                        <p:strVal val="visible"/>
+                                      </p:to>
+                                    </p:set>
+                                  </p:childTnLst>
+                                </p:cTn>
+                              </p:par>
+                              <p:par>
+                                <p:cTn id="13" presetID="1" presetClass="entr" presetSubtype="0" fill="hold" nodeType="withEffect">
+                                  <p:stCondLst>
+                                    <p:cond delay="0"/>
+                                  </p:stCondLst>
+                                  <p:childTnLst>
+                                    <p:set>
+                                      <p:cBhvr>
+                                        <p:cTn id="14" dur="1" fill="hold">
+                                          <p:stCondLst>
+                                            <p:cond delay="0"/>
+                                          </p:stCondLst>
+                                        </p:cTn>
+                                        <p:tgtEl>
+                                          <p:spTgt spid="4">
+                                            <p:txEl>
+                                              <p:pRg st="1" end="1"/>
+                                            </p:txEl>
+                                          </p:spTgt>
+                                        </p:tgtEl>
+                                        <p:attrNameLst>
+                                          <p:attrName>style.visibility</p:attrName>
+                                        </p:attrNameLst>
+                                      </p:cBhvr>
+                                      <p:to>
+                                        <p:strVal val="visible"/>
+                                      </p:to>
+                                    </p:set>
+                                  </p:childTnLst>
+                                </p:cTn>
+                              </p:par>
+                              <p:par>
+                                <p:cTn id="15" presetID="1" presetClass="entr" presetSubtype="0" fill="hold" nodeType="withEffect">
+                                  <p:stCondLst>
+                                    <p:cond delay="0"/>
+                                  </p:stCondLst>
+                                  <p:childTnLst>
+                                    <p:set>
+                                      <p:cBhvr>
+                                        <p:cTn id="16" dur="1" fill="hold">
+                                          <p:stCondLst>
+                                            <p:cond delay="0"/>
+                                          </p:stCondLst>
+                                        </p:cTn>
+                                        <p:tgtEl>
+                                          <p:spTgt spid="4">
+                                            <p:txEl>
+                                              <p:pRg st="2" end="2"/>
+                                            </p:txEl>
+                                          </p:spTgt>
+                                        </p:tgtEl>
+                                        <p:attrNameLst>
+                                          <p:attrName>style.visibility</p:attrName>
+                                        </p:attrNameLst>
+                                      </p:cBhvr>
+                                      <p:to>
+                                        <p:strVal val="visible"/>
+                                      </p:to>
+                                    </p:set>
+                                  </p:childTnLst>
+                                </p:cTn>
+                              </p:par>
+                              <p:par>
+                                <p:cTn id="17" presetID="1" presetClass="entr" presetSubtype="0" fill="hold" nodeType="withEffect">
+                                  <p:stCondLst>
+                                    <p:cond delay="0"/>
+                                  </p:stCondLst>
+                                  <p:childTnLst>
+                                    <p:set>
+                                      <p:cBhvr>
+                                        <p:cTn id="18" dur="1" fill="hold">
+                                          <p:stCondLst>
+                                            <p:cond delay="0"/>
+                                          </p:stCondLst>
+                                        </p:cTn>
+                                        <p:tgtEl>
+                                          <p:spTgt spid="4">
+                                            <p:txEl>
+                                              <p:pRg st="3" end="3"/>
+                                            </p:txEl>
+                                          </p:spTgt>
+                                        </p:tgtEl>
+                                        <p:attrNameLst>
+                                          <p:attrName>style.visibility</p:attrName>
+                                        </p:attrNameLst>
+                                      </p:cBhvr>
+                                      <p:to>
+                                        <p:strVal val="visible"/>
+                                      </p:to>
+                                    </p:set>
+                                  </p:childTnLst>
+                                </p:cTn>
+                              </p:par>
+                              <p:par>
+                                <p:cTn id="19" presetID="1" presetClass="entr" presetSubtype="0" fill="hold" nodeType="withEffect">
+                                  <p:stCondLst>
+                                    <p:cond delay="0"/>
+                                  </p:stCondLst>
+                                  <p:childTnLst>
+                                    <p:set>
+                                      <p:cBhvr>
+                                        <p:cTn id="20" dur="1" fill="hold">
+                                          <p:stCondLst>
+                                            <p:cond delay="0"/>
+                                          </p:stCondLst>
+                                        </p:cTn>
+                                        <p:tgtEl>
+                                          <p:spTgt spid="4">
+                                            <p:txEl>
+                                              <p:pRg st="4" end="4"/>
+                                            </p:txEl>
+                                          </p:spTgt>
+                                        </p:tgtEl>
+                                        <p:attrNameLst>
+                                          <p:attrName>style.visibility</p:attrName>
+                                        </p:attrNameLst>
+                                      </p:cBhvr>
+                                      <p:to>
+                                        <p:strVal val="visible"/>
+                                      </p:to>
+                                    </p:set>
+                                  </p:childTnLst>
+                                </p:cTn>
+                              </p:par>
+                            </p:childTnLst>
+                          </p:cTn>
+                        </p:par>
+                      </p:childTnLst>
+                    </p:cTn>
+                  </p:par>
+                  <p:par>
+                    <p:cTn id="21" fill="hold">
+                      <p:stCondLst>
+                        <p:cond delay="indefinite"/>
+                      </p:stCondLst>
+                      <p:childTnLst>
+                        <p:par>
+                          <p:cTn id="22" fill="hold">
+                            <p:stCondLst>
+                              <p:cond delay="0"/>
+                            </p:stCondLst>
+                            <p:childTnLst>
+                              <p:par>
+                                <p:cTn id="23" presetID="1" presetClass="entr" presetSubtype="0" fill="hold" nodeType="clickEffect">
+                                  <p:stCondLst>
+                                    <p:cond delay="0"/>
+                                  </p:stCondLst>
+                                  <p:childTnLst>
+                                    <p:set>
+                                      <p:cBhvr>
+                                        <p:cTn id="24" dur="1" fill="hold">
+                                          <p:stCondLst>
+                                            <p:cond delay="0"/>
+                                          </p:stCondLst>
+                                        </p:cTn>
+                                        <p:tgtEl>
+                                          <p:spTgt spid="4">
+                                            <p:txEl>
+                                              <p:pRg st="6" end="6"/>
+                                            </p:txEl>
+                                          </p:spTgt>
+                                        </p:tgtEl>
+                                        <p:attrNameLst>
+                                          <p:attrName>style.visibility</p:attrName>
+                                        </p:attrNameLst>
+                                      </p:cBhvr>
+                                      <p:to>
+                                        <p:strVal val="visible"/>
+                                      </p:to>
+                                    </p:set>
+                                  </p:childTnLst>
+                                </p:cTn>
+                              </p:par>
+                              <p:par>
+                                <p:cTn id="25" presetID="1" presetClass="entr" presetSubtype="0" fill="hold" nodeType="withEffect">
+                                  <p:stCondLst>
+                                    <p:cond delay="0"/>
+                                  </p:stCondLst>
+                                  <p:childTnLst>
+                                    <p:set>
+                                      <p:cBhvr>
+                                        <p:cTn id="26" dur="1" fill="hold">
+                                          <p:stCondLst>
+                                            <p:cond delay="0"/>
+                                          </p:stCondLst>
+                                        </p:cTn>
+                                        <p:tgtEl>
+                                          <p:spTgt spid="4">
+                                            <p:txEl>
+                                              <p:pRg st="7" end="7"/>
+                                            </p:txEl>
+                                          </p:spTgt>
+                                        </p:tgtEl>
+                                        <p:attrNameLst>
+                                          <p:attrName>style.visibility</p:attrName>
+                                        </p:attrNameLst>
+                                      </p:cBhvr>
+                                      <p:to>
+                                        <p:strVal val="visible"/>
+                                      </p:to>
+                                    </p:set>
+                                  </p:childTnLst>
+                                </p:cTn>
+                              </p:par>
+                              <p:par>
+                                <p:cTn id="27" presetID="1" presetClass="entr" presetSubtype="0" fill="hold" nodeType="withEffect">
+                                  <p:stCondLst>
+                                    <p:cond delay="0"/>
+                                  </p:stCondLst>
+                                  <p:childTnLst>
+                                    <p:set>
+                                      <p:cBhvr>
+                                        <p:cTn id="28" dur="1" fill="hold">
+                                          <p:stCondLst>
+                                            <p:cond delay="0"/>
+                                          </p:stCondLst>
+                                        </p:cTn>
+                                        <p:tgtEl>
+                                          <p:spTgt spid="4">
+                                            <p:txEl>
+                                              <p:pRg st="8" end="8"/>
+                                            </p:txEl>
+                                          </p:spTgt>
+                                        </p:tgtEl>
+                                        <p:attrNameLst>
+                                          <p:attrName>style.visibility</p:attrName>
+                                        </p:attrNameLst>
+                                      </p:cBhvr>
+                                      <p:to>
+                                        <p:strVal val="visible"/>
+                                      </p:to>
+                                    </p:set>
+                                  </p:childTnLst>
+                                </p:cTn>
+                              </p:par>
+                              <p:par>
+                                <p:cTn id="29" presetID="1" presetClass="entr" presetSubtype="0" fill="hold" nodeType="withEffect">
+                                  <p:stCondLst>
+                                    <p:cond delay="0"/>
+                                  </p:stCondLst>
+                                  <p:childTnLst>
+                                    <p:set>
+                                      <p:cBhvr>
+                                        <p:cTn id="30" dur="1" fill="hold">
+                                          <p:stCondLst>
+                                            <p:cond delay="0"/>
+                                          </p:stCondLst>
+                                        </p:cTn>
+                                        <p:tgtEl>
+                                          <p:spTgt spid="4">
+                                            <p:txEl>
+                                              <p:pRg st="9" end="9"/>
+                                            </p:txEl>
+                                          </p:spTgt>
+                                        </p:tgtEl>
+                                        <p:attrNameLst>
+                                          <p:attrName>style.visibility</p:attrName>
+                                        </p:attrNameLst>
+                                      </p:cBhvr>
+                                      <p:to>
+                                        <p:strVal val="visible"/>
+                                      </p:to>
+                                    </p:set>
+                                  </p:childTnLst>
+                                </p:cTn>
+                              </p:par>
+                              <p:par>
+                                <p:cTn id="31" presetID="1" presetClass="entr" presetSubtype="0" fill="hold" nodeType="withEffect">
+                                  <p:stCondLst>
+                                    <p:cond delay="0"/>
+                                  </p:stCondLst>
+                                  <p:childTnLst>
+                                    <p:set>
+                                      <p:cBhvr>
+                                        <p:cTn id="32" dur="1" fill="hold">
+                                          <p:stCondLst>
+                                            <p:cond delay="0"/>
+                                          </p:stCondLst>
+                                        </p:cTn>
+                                        <p:tgtEl>
+                                          <p:spTgt spid="4">
+                                            <p:txEl>
+                                              <p:pRg st="10" end="10"/>
+                                            </p:txEl>
+                                          </p:spTgt>
+                                        </p:tgtEl>
+                                        <p:attrNameLst>
+                                          <p:attrName>style.visibility</p:attrName>
+                                        </p:attrNameLst>
+                                      </p:cBhvr>
+                                      <p:to>
+                                        <p:strVal val="visible"/>
+                                      </p:to>
+                                    </p:set>
+                                  </p:childTnLst>
+                                </p:cTn>
+                              </p:par>
+                              <p:par>
+                                <p:cTn id="33" presetID="1" presetClass="entr" presetSubtype="0" fill="hold" nodeType="withEffect">
+                                  <p:stCondLst>
+                                    <p:cond delay="0"/>
+                                  </p:stCondLst>
+                                  <p:childTnLst>
+                                    <p:set>
+                                      <p:cBhvr>
+                                        <p:cTn id="34" dur="1" fill="hold">
+                                          <p:stCondLst>
+                                            <p:cond delay="0"/>
+                                          </p:stCondLst>
+                                        </p:cTn>
+                                        <p:tgtEl>
+                                          <p:spTgt spid="4">
+                                            <p:txEl>
+                                              <p:pRg st="11" end="11"/>
+                                            </p:txEl>
+                                          </p:spTgt>
+                                        </p:tgtEl>
+                                        <p:attrNameLst>
+                                          <p:attrName>style.visibility</p:attrName>
+                                        </p:attrNameLst>
+                                      </p:cBhvr>
+                                      <p:to>
+                                        <p:strVal val="visible"/>
+                                      </p:to>
+                                    </p:set>
+                                  </p:childTnLst>
+                                </p:cTn>
+                              </p:par>
+                              <p:par>
+                                <p:cTn id="35" presetID="1" presetClass="entr" presetSubtype="0" fill="hold" nodeType="withEffect">
+                                  <p:stCondLst>
+                                    <p:cond delay="0"/>
+                                  </p:stCondLst>
+                                  <p:childTnLst>
+                                    <p:set>
+                                      <p:cBhvr>
+                                        <p:cTn id="36" dur="1" fill="hold">
+                                          <p:stCondLst>
+                                            <p:cond delay="0"/>
+                                          </p:stCondLst>
+                                        </p:cTn>
+                                        <p:tgtEl>
+                                          <p:spTgt spid="4">
+                                            <p:txEl>
+                                              <p:pRg st="12" end="12"/>
+                                            </p:txEl>
+                                          </p:spTgt>
+                                        </p:tgtEl>
+                                        <p:attrNameLst>
+                                          <p:attrName>style.visibility</p:attrName>
+                                        </p:attrNameLst>
+                                      </p:cBhvr>
+                                      <p:to>
+                                        <p:strVal val="visible"/>
+                                      </p:to>
+                                    </p:set>
+                                  </p:childTnLst>
+                                </p:cTn>
+                              </p:par>
+                              <p:par>
+                                <p:cTn id="37" presetID="1" presetClass="entr" presetSubtype="0" fill="hold" nodeType="withEffect">
+                                  <p:stCondLst>
+                                    <p:cond delay="0"/>
+                                  </p:stCondLst>
+                                  <p:childTnLst>
+                                    <p:set>
+                                      <p:cBhvr>
+                                        <p:cTn id="38" dur="1" fill="hold">
+                                          <p:stCondLst>
+                                            <p:cond delay="0"/>
+                                          </p:stCondLst>
+                                        </p:cTn>
+                                        <p:tgtEl>
+                                          <p:spTgt spid="4">
+                                            <p:txEl>
+                                              <p:pRg st="13" end="13"/>
+                                            </p:txEl>
+                                          </p:spTgt>
+                                        </p:tgtEl>
+                                        <p:attrNameLst>
+                                          <p:attrName>style.visibility</p:attrName>
+                                        </p:attrNameLst>
+                                      </p:cBhvr>
+                                      <p:to>
+                                        <p:strVal val="visible"/>
+                                      </p:to>
+                                    </p:set>
+                                  </p:childTnLst>
+                                </p:cTn>
+                              </p:par>
+                            </p:childTnLst>
+                          </p:cTn>
+                        </p:par>
+                      </p:childTnLst>
+                    </p:cTn>
+                  </p:par>
                 </p:childTnLst>
               </p:cTn>
               <p:prevCondLst>
@@ -18576,6 +18999,529 @@
   <p:clrMapOvr>
     <a:masterClrMapping/>
   </p:clrMapOvr>
+  <p:timing>
+    <p:tnLst>
+      <p:par>
+        <p:cTn id="1" dur="indefinite" restart="never" nodeType="tmRoot">
+          <p:childTnLst>
+            <p:seq concurrent="1" nextAc="seek">
+              <p:cTn id="2" dur="indefinite" nodeType="mainSeq">
+                <p:childTnLst>
+                  <p:par>
+                    <p:cTn id="3" fill="hold">
+                      <p:stCondLst>
+                        <p:cond delay="indefinite"/>
+                      </p:stCondLst>
+                      <p:childTnLst>
+                        <p:par>
+                          <p:cTn id="4" fill="hold">
+                            <p:stCondLst>
+                              <p:cond delay="0"/>
+                            </p:stCondLst>
+                            <p:childTnLst>
+                              <p:par>
+                                <p:cTn id="5" presetID="1" presetClass="entr" presetSubtype="0" fill="hold" nodeType="clickEffect">
+                                  <p:stCondLst>
+                                    <p:cond delay="0"/>
+                                  </p:stCondLst>
+                                  <p:childTnLst>
+                                    <p:set>
+                                      <p:cBhvr>
+                                        <p:cTn id="6" dur="1" fill="hold">
+                                          <p:stCondLst>
+                                            <p:cond delay="0"/>
+                                          </p:stCondLst>
+                                        </p:cTn>
+                                        <p:tgtEl>
+                                          <p:spTgt spid="3">
+                                            <p:txEl>
+                                              <p:pRg st="0" end="0"/>
+                                            </p:txEl>
+                                          </p:spTgt>
+                                        </p:tgtEl>
+                                        <p:attrNameLst>
+                                          <p:attrName>style.visibility</p:attrName>
+                                        </p:attrNameLst>
+                                      </p:cBhvr>
+                                      <p:to>
+                                        <p:strVal val="visible"/>
+                                      </p:to>
+                                    </p:set>
+                                  </p:childTnLst>
+                                </p:cTn>
+                              </p:par>
+                            </p:childTnLst>
+                          </p:cTn>
+                        </p:par>
+                      </p:childTnLst>
+                    </p:cTn>
+                  </p:par>
+                  <p:par>
+                    <p:cTn id="7" fill="hold">
+                      <p:stCondLst>
+                        <p:cond delay="indefinite"/>
+                      </p:stCondLst>
+                      <p:childTnLst>
+                        <p:par>
+                          <p:cTn id="8" fill="hold">
+                            <p:stCondLst>
+                              <p:cond delay="0"/>
+                            </p:stCondLst>
+                            <p:childTnLst>
+                              <p:par>
+                                <p:cTn id="9" presetID="1" presetClass="entr" presetSubtype="0" fill="hold" nodeType="clickEffect">
+                                  <p:stCondLst>
+                                    <p:cond delay="0"/>
+                                  </p:stCondLst>
+                                  <p:childTnLst>
+                                    <p:set>
+                                      <p:cBhvr>
+                                        <p:cTn id="10" dur="1" fill="hold">
+                                          <p:stCondLst>
+                                            <p:cond delay="0"/>
+                                          </p:stCondLst>
+                                        </p:cTn>
+                                        <p:tgtEl>
+                                          <p:spTgt spid="3">
+                                            <p:txEl>
+                                              <p:pRg st="1" end="1"/>
+                                            </p:txEl>
+                                          </p:spTgt>
+                                        </p:tgtEl>
+                                        <p:attrNameLst>
+                                          <p:attrName>style.visibility</p:attrName>
+                                        </p:attrNameLst>
+                                      </p:cBhvr>
+                                      <p:to>
+                                        <p:strVal val="visible"/>
+                                      </p:to>
+                                    </p:set>
+                                  </p:childTnLst>
+                                </p:cTn>
+                              </p:par>
+                              <p:par>
+                                <p:cTn id="11" presetID="1" presetClass="entr" presetSubtype="0" fill="hold" nodeType="withEffect">
+                                  <p:stCondLst>
+                                    <p:cond delay="0"/>
+                                  </p:stCondLst>
+                                  <p:childTnLst>
+                                    <p:set>
+                                      <p:cBhvr>
+                                        <p:cTn id="12" dur="1" fill="hold">
+                                          <p:stCondLst>
+                                            <p:cond delay="0"/>
+                                          </p:stCondLst>
+                                        </p:cTn>
+                                        <p:tgtEl>
+                                          <p:spTgt spid="3">
+                                            <p:txEl>
+                                              <p:pRg st="2" end="2"/>
+                                            </p:txEl>
+                                          </p:spTgt>
+                                        </p:tgtEl>
+                                        <p:attrNameLst>
+                                          <p:attrName>style.visibility</p:attrName>
+                                        </p:attrNameLst>
+                                      </p:cBhvr>
+                                      <p:to>
+                                        <p:strVal val="visible"/>
+                                      </p:to>
+                                    </p:set>
+                                  </p:childTnLst>
+                                </p:cTn>
+                              </p:par>
+                            </p:childTnLst>
+                          </p:cTn>
+                        </p:par>
+                      </p:childTnLst>
+                    </p:cTn>
+                  </p:par>
+                  <p:par>
+                    <p:cTn id="13" fill="hold">
+                      <p:stCondLst>
+                        <p:cond delay="indefinite"/>
+                      </p:stCondLst>
+                      <p:childTnLst>
+                        <p:par>
+                          <p:cTn id="14" fill="hold">
+                            <p:stCondLst>
+                              <p:cond delay="0"/>
+                            </p:stCondLst>
+                            <p:childTnLst>
+                              <p:par>
+                                <p:cTn id="15" presetID="1" presetClass="entr" presetSubtype="0" fill="hold" nodeType="clickEffect">
+                                  <p:stCondLst>
+                                    <p:cond delay="0"/>
+                                  </p:stCondLst>
+                                  <p:childTnLst>
+                                    <p:set>
+                                      <p:cBhvr>
+                                        <p:cTn id="16" dur="1" fill="hold">
+                                          <p:stCondLst>
+                                            <p:cond delay="0"/>
+                                          </p:stCondLst>
+                                        </p:cTn>
+                                        <p:tgtEl>
+                                          <p:spTgt spid="4">
+                                            <p:txEl>
+                                              <p:pRg st="0" end="0"/>
+                                            </p:txEl>
+                                          </p:spTgt>
+                                        </p:tgtEl>
+                                        <p:attrNameLst>
+                                          <p:attrName>style.visibility</p:attrName>
+                                        </p:attrNameLst>
+                                      </p:cBhvr>
+                                      <p:to>
+                                        <p:strVal val="visible"/>
+                                      </p:to>
+                                    </p:set>
+                                  </p:childTnLst>
+                                </p:cTn>
+                              </p:par>
+                              <p:par>
+                                <p:cTn id="17" presetID="1" presetClass="entr" presetSubtype="0" fill="hold" nodeType="withEffect">
+                                  <p:stCondLst>
+                                    <p:cond delay="0"/>
+                                  </p:stCondLst>
+                                  <p:childTnLst>
+                                    <p:set>
+                                      <p:cBhvr>
+                                        <p:cTn id="18" dur="1" fill="hold">
+                                          <p:stCondLst>
+                                            <p:cond delay="0"/>
+                                          </p:stCondLst>
+                                        </p:cTn>
+                                        <p:tgtEl>
+                                          <p:spTgt spid="4">
+                                            <p:txEl>
+                                              <p:pRg st="1" end="1"/>
+                                            </p:txEl>
+                                          </p:spTgt>
+                                        </p:tgtEl>
+                                        <p:attrNameLst>
+                                          <p:attrName>style.visibility</p:attrName>
+                                        </p:attrNameLst>
+                                      </p:cBhvr>
+                                      <p:to>
+                                        <p:strVal val="visible"/>
+                                      </p:to>
+                                    </p:set>
+                                  </p:childTnLst>
+                                </p:cTn>
+                              </p:par>
+                            </p:childTnLst>
+                          </p:cTn>
+                        </p:par>
+                      </p:childTnLst>
+                    </p:cTn>
+                  </p:par>
+                  <p:par>
+                    <p:cTn id="19" fill="hold">
+                      <p:stCondLst>
+                        <p:cond delay="indefinite"/>
+                      </p:stCondLst>
+                      <p:childTnLst>
+                        <p:par>
+                          <p:cTn id="20" fill="hold">
+                            <p:stCondLst>
+                              <p:cond delay="0"/>
+                            </p:stCondLst>
+                            <p:childTnLst>
+                              <p:par>
+                                <p:cTn id="21" presetID="1" presetClass="entr" presetSubtype="0" fill="hold" nodeType="clickEffect">
+                                  <p:stCondLst>
+                                    <p:cond delay="0"/>
+                                  </p:stCondLst>
+                                  <p:childTnLst>
+                                    <p:set>
+                                      <p:cBhvr>
+                                        <p:cTn id="22" dur="1" fill="hold">
+                                          <p:stCondLst>
+                                            <p:cond delay="0"/>
+                                          </p:stCondLst>
+                                        </p:cTn>
+                                        <p:tgtEl>
+                                          <p:spTgt spid="4">
+                                            <p:txEl>
+                                              <p:pRg st="2" end="2"/>
+                                            </p:txEl>
+                                          </p:spTgt>
+                                        </p:tgtEl>
+                                        <p:attrNameLst>
+                                          <p:attrName>style.visibility</p:attrName>
+                                        </p:attrNameLst>
+                                      </p:cBhvr>
+                                      <p:to>
+                                        <p:strVal val="visible"/>
+                                      </p:to>
+                                    </p:set>
+                                  </p:childTnLst>
+                                </p:cTn>
+                              </p:par>
+                              <p:par>
+                                <p:cTn id="23" presetID="1" presetClass="entr" presetSubtype="0" fill="hold" nodeType="withEffect">
+                                  <p:stCondLst>
+                                    <p:cond delay="0"/>
+                                  </p:stCondLst>
+                                  <p:childTnLst>
+                                    <p:set>
+                                      <p:cBhvr>
+                                        <p:cTn id="24" dur="1" fill="hold">
+                                          <p:stCondLst>
+                                            <p:cond delay="0"/>
+                                          </p:stCondLst>
+                                        </p:cTn>
+                                        <p:tgtEl>
+                                          <p:spTgt spid="4">
+                                            <p:txEl>
+                                              <p:pRg st="3" end="3"/>
+                                            </p:txEl>
+                                          </p:spTgt>
+                                        </p:tgtEl>
+                                        <p:attrNameLst>
+                                          <p:attrName>style.visibility</p:attrName>
+                                        </p:attrNameLst>
+                                      </p:cBhvr>
+                                      <p:to>
+                                        <p:strVal val="visible"/>
+                                      </p:to>
+                                    </p:set>
+                                  </p:childTnLst>
+                                </p:cTn>
+                              </p:par>
+                            </p:childTnLst>
+                          </p:cTn>
+                        </p:par>
+                      </p:childTnLst>
+                    </p:cTn>
+                  </p:par>
+                  <p:par>
+                    <p:cTn id="25" fill="hold">
+                      <p:stCondLst>
+                        <p:cond delay="indefinite"/>
+                      </p:stCondLst>
+                      <p:childTnLst>
+                        <p:par>
+                          <p:cTn id="26" fill="hold">
+                            <p:stCondLst>
+                              <p:cond delay="0"/>
+                            </p:stCondLst>
+                            <p:childTnLst>
+                              <p:par>
+                                <p:cTn id="27" presetID="1" presetClass="entr" presetSubtype="0" fill="hold" nodeType="clickEffect">
+                                  <p:stCondLst>
+                                    <p:cond delay="0"/>
+                                  </p:stCondLst>
+                                  <p:childTnLst>
+                                    <p:set>
+                                      <p:cBhvr>
+                                        <p:cTn id="28" dur="1" fill="hold">
+                                          <p:stCondLst>
+                                            <p:cond delay="0"/>
+                                          </p:stCondLst>
+                                        </p:cTn>
+                                        <p:tgtEl>
+                                          <p:spTgt spid="4">
+                                            <p:txEl>
+                                              <p:pRg st="4" end="4"/>
+                                            </p:txEl>
+                                          </p:spTgt>
+                                        </p:tgtEl>
+                                        <p:attrNameLst>
+                                          <p:attrName>style.visibility</p:attrName>
+                                        </p:attrNameLst>
+                                      </p:cBhvr>
+                                      <p:to>
+                                        <p:strVal val="visible"/>
+                                      </p:to>
+                                    </p:set>
+                                  </p:childTnLst>
+                                </p:cTn>
+                              </p:par>
+                              <p:par>
+                                <p:cTn id="29" presetID="1" presetClass="entr" presetSubtype="0" fill="hold" nodeType="withEffect">
+                                  <p:stCondLst>
+                                    <p:cond delay="0"/>
+                                  </p:stCondLst>
+                                  <p:childTnLst>
+                                    <p:set>
+                                      <p:cBhvr>
+                                        <p:cTn id="30" dur="1" fill="hold">
+                                          <p:stCondLst>
+                                            <p:cond delay="0"/>
+                                          </p:stCondLst>
+                                        </p:cTn>
+                                        <p:tgtEl>
+                                          <p:spTgt spid="4">
+                                            <p:txEl>
+                                              <p:pRg st="5" end="5"/>
+                                            </p:txEl>
+                                          </p:spTgt>
+                                        </p:tgtEl>
+                                        <p:attrNameLst>
+                                          <p:attrName>style.visibility</p:attrName>
+                                        </p:attrNameLst>
+                                      </p:cBhvr>
+                                      <p:to>
+                                        <p:strVal val="visible"/>
+                                      </p:to>
+                                    </p:set>
+                                  </p:childTnLst>
+                                </p:cTn>
+                              </p:par>
+                              <p:par>
+                                <p:cTn id="31" presetID="1" presetClass="entr" presetSubtype="0" fill="hold" nodeType="withEffect">
+                                  <p:stCondLst>
+                                    <p:cond delay="0"/>
+                                  </p:stCondLst>
+                                  <p:childTnLst>
+                                    <p:set>
+                                      <p:cBhvr>
+                                        <p:cTn id="32" dur="1" fill="hold">
+                                          <p:stCondLst>
+                                            <p:cond delay="0"/>
+                                          </p:stCondLst>
+                                        </p:cTn>
+                                        <p:tgtEl>
+                                          <p:spTgt spid="4">
+                                            <p:txEl>
+                                              <p:pRg st="6" end="6"/>
+                                            </p:txEl>
+                                          </p:spTgt>
+                                        </p:tgtEl>
+                                        <p:attrNameLst>
+                                          <p:attrName>style.visibility</p:attrName>
+                                        </p:attrNameLst>
+                                      </p:cBhvr>
+                                      <p:to>
+                                        <p:strVal val="visible"/>
+                                      </p:to>
+                                    </p:set>
+                                  </p:childTnLst>
+                                </p:cTn>
+                              </p:par>
+                              <p:par>
+                                <p:cTn id="33" presetID="1" presetClass="entr" presetSubtype="0" fill="hold" nodeType="withEffect">
+                                  <p:stCondLst>
+                                    <p:cond delay="0"/>
+                                  </p:stCondLst>
+                                  <p:childTnLst>
+                                    <p:set>
+                                      <p:cBhvr>
+                                        <p:cTn id="34" dur="1" fill="hold">
+                                          <p:stCondLst>
+                                            <p:cond delay="0"/>
+                                          </p:stCondLst>
+                                        </p:cTn>
+                                        <p:tgtEl>
+                                          <p:spTgt spid="4">
+                                            <p:txEl>
+                                              <p:pRg st="7" end="7"/>
+                                            </p:txEl>
+                                          </p:spTgt>
+                                        </p:tgtEl>
+                                        <p:attrNameLst>
+                                          <p:attrName>style.visibility</p:attrName>
+                                        </p:attrNameLst>
+                                      </p:cBhvr>
+                                      <p:to>
+                                        <p:strVal val="visible"/>
+                                      </p:to>
+                                    </p:set>
+                                  </p:childTnLst>
+                                </p:cTn>
+                              </p:par>
+                              <p:par>
+                                <p:cTn id="35" presetID="1" presetClass="entr" presetSubtype="0" fill="hold" nodeType="withEffect">
+                                  <p:stCondLst>
+                                    <p:cond delay="0"/>
+                                  </p:stCondLst>
+                                  <p:childTnLst>
+                                    <p:set>
+                                      <p:cBhvr>
+                                        <p:cTn id="36" dur="1" fill="hold">
+                                          <p:stCondLst>
+                                            <p:cond delay="0"/>
+                                          </p:stCondLst>
+                                        </p:cTn>
+                                        <p:tgtEl>
+                                          <p:spTgt spid="4">
+                                            <p:txEl>
+                                              <p:pRg st="8" end="8"/>
+                                            </p:txEl>
+                                          </p:spTgt>
+                                        </p:tgtEl>
+                                        <p:attrNameLst>
+                                          <p:attrName>style.visibility</p:attrName>
+                                        </p:attrNameLst>
+                                      </p:cBhvr>
+                                      <p:to>
+                                        <p:strVal val="visible"/>
+                                      </p:to>
+                                    </p:set>
+                                  </p:childTnLst>
+                                </p:cTn>
+                              </p:par>
+                              <p:par>
+                                <p:cTn id="37" presetID="1" presetClass="entr" presetSubtype="0" fill="hold" nodeType="withEffect">
+                                  <p:stCondLst>
+                                    <p:cond delay="0"/>
+                                  </p:stCondLst>
+                                  <p:childTnLst>
+                                    <p:set>
+                                      <p:cBhvr>
+                                        <p:cTn id="38" dur="1" fill="hold">
+                                          <p:stCondLst>
+                                            <p:cond delay="0"/>
+                                          </p:stCondLst>
+                                        </p:cTn>
+                                        <p:tgtEl>
+                                          <p:spTgt spid="4">
+                                            <p:txEl>
+                                              <p:pRg st="9" end="9"/>
+                                            </p:txEl>
+                                          </p:spTgt>
+                                        </p:tgtEl>
+                                        <p:attrNameLst>
+                                          <p:attrName>style.visibility</p:attrName>
+                                        </p:attrNameLst>
+                                      </p:cBhvr>
+                                      <p:to>
+                                        <p:strVal val="visible"/>
+                                      </p:to>
+                                    </p:set>
+                                  </p:childTnLst>
+                                </p:cTn>
+                              </p:par>
+                            </p:childTnLst>
+                          </p:cTn>
+                        </p:par>
+                      </p:childTnLst>
+                    </p:cTn>
+                  </p:par>
+                </p:childTnLst>
+              </p:cTn>
+              <p:prevCondLst>
+                <p:cond evt="onPrev" delay="0">
+                  <p:tgtEl>
+                    <p:sldTgt/>
+                  </p:tgtEl>
+                </p:cond>
+              </p:prevCondLst>
+              <p:nextCondLst>
+                <p:cond evt="onNext" delay="0">
+                  <p:tgtEl>
+                    <p:sldTgt/>
+                  </p:tgtEl>
+                </p:cond>
+              </p:nextCondLst>
+            </p:seq>
+          </p:childTnLst>
+        </p:cTn>
+      </p:par>
+    </p:tnLst>
+  </p:timing>
 </p:sld>
 </file>
 
@@ -18862,6 +19808,356 @@
   <p:clrMapOvr>
     <a:masterClrMapping/>
   </p:clrMapOvr>
+  <p:timing>
+    <p:tnLst>
+      <p:par>
+        <p:cTn id="1" dur="indefinite" restart="never" nodeType="tmRoot">
+          <p:childTnLst>
+            <p:seq concurrent="1" nextAc="seek">
+              <p:cTn id="2" dur="indefinite" nodeType="mainSeq">
+                <p:childTnLst>
+                  <p:par>
+                    <p:cTn id="3" fill="hold">
+                      <p:stCondLst>
+                        <p:cond delay="indefinite"/>
+                      </p:stCondLst>
+                      <p:childTnLst>
+                        <p:par>
+                          <p:cTn id="4" fill="hold">
+                            <p:stCondLst>
+                              <p:cond delay="0"/>
+                            </p:stCondLst>
+                            <p:childTnLst>
+                              <p:par>
+                                <p:cTn id="5" presetID="1" presetClass="entr" presetSubtype="0" fill="hold" nodeType="clickEffect">
+                                  <p:stCondLst>
+                                    <p:cond delay="0"/>
+                                  </p:stCondLst>
+                                  <p:childTnLst>
+                                    <p:set>
+                                      <p:cBhvr>
+                                        <p:cTn id="6" dur="1" fill="hold">
+                                          <p:stCondLst>
+                                            <p:cond delay="0"/>
+                                          </p:stCondLst>
+                                        </p:cTn>
+                                        <p:tgtEl>
+                                          <p:spTgt spid="3">
+                                            <p:txEl>
+                                              <p:pRg st="0" end="0"/>
+                                            </p:txEl>
+                                          </p:spTgt>
+                                        </p:tgtEl>
+                                        <p:attrNameLst>
+                                          <p:attrName>style.visibility</p:attrName>
+                                        </p:attrNameLst>
+                                      </p:cBhvr>
+                                      <p:to>
+                                        <p:strVal val="visible"/>
+                                      </p:to>
+                                    </p:set>
+                                  </p:childTnLst>
+                                </p:cTn>
+                              </p:par>
+                            </p:childTnLst>
+                          </p:cTn>
+                        </p:par>
+                      </p:childTnLst>
+                    </p:cTn>
+                  </p:par>
+                  <p:par>
+                    <p:cTn id="7" fill="hold">
+                      <p:stCondLst>
+                        <p:cond delay="indefinite"/>
+                      </p:stCondLst>
+                      <p:childTnLst>
+                        <p:par>
+                          <p:cTn id="8" fill="hold">
+                            <p:stCondLst>
+                              <p:cond delay="0"/>
+                            </p:stCondLst>
+                            <p:childTnLst>
+                              <p:par>
+                                <p:cTn id="9" presetID="1" presetClass="entr" presetSubtype="0" fill="hold" nodeType="clickEffect">
+                                  <p:stCondLst>
+                                    <p:cond delay="0"/>
+                                  </p:stCondLst>
+                                  <p:childTnLst>
+                                    <p:set>
+                                      <p:cBhvr>
+                                        <p:cTn id="10" dur="1" fill="hold">
+                                          <p:stCondLst>
+                                            <p:cond delay="0"/>
+                                          </p:stCondLst>
+                                        </p:cTn>
+                                        <p:tgtEl>
+                                          <p:spTgt spid="3">
+                                            <p:txEl>
+                                              <p:pRg st="1" end="1"/>
+                                            </p:txEl>
+                                          </p:spTgt>
+                                        </p:tgtEl>
+                                        <p:attrNameLst>
+                                          <p:attrName>style.visibility</p:attrName>
+                                        </p:attrNameLst>
+                                      </p:cBhvr>
+                                      <p:to>
+                                        <p:strVal val="visible"/>
+                                      </p:to>
+                                    </p:set>
+                                  </p:childTnLst>
+                                </p:cTn>
+                              </p:par>
+                              <p:par>
+                                <p:cTn id="11" presetID="1" presetClass="entr" presetSubtype="0" fill="hold" nodeType="withEffect">
+                                  <p:stCondLst>
+                                    <p:cond delay="0"/>
+                                  </p:stCondLst>
+                                  <p:childTnLst>
+                                    <p:set>
+                                      <p:cBhvr>
+                                        <p:cTn id="12" dur="1" fill="hold">
+                                          <p:stCondLst>
+                                            <p:cond delay="0"/>
+                                          </p:stCondLst>
+                                        </p:cTn>
+                                        <p:tgtEl>
+                                          <p:spTgt spid="3">
+                                            <p:txEl>
+                                              <p:pRg st="2" end="2"/>
+                                            </p:txEl>
+                                          </p:spTgt>
+                                        </p:tgtEl>
+                                        <p:attrNameLst>
+                                          <p:attrName>style.visibility</p:attrName>
+                                        </p:attrNameLst>
+                                      </p:cBhvr>
+                                      <p:to>
+                                        <p:strVal val="visible"/>
+                                      </p:to>
+                                    </p:set>
+                                  </p:childTnLst>
+                                </p:cTn>
+                              </p:par>
+                            </p:childTnLst>
+                          </p:cTn>
+                        </p:par>
+                      </p:childTnLst>
+                    </p:cTn>
+                  </p:par>
+                  <p:par>
+                    <p:cTn id="13" fill="hold">
+                      <p:stCondLst>
+                        <p:cond delay="indefinite"/>
+                      </p:stCondLst>
+                      <p:childTnLst>
+                        <p:par>
+                          <p:cTn id="14" fill="hold">
+                            <p:stCondLst>
+                              <p:cond delay="0"/>
+                            </p:stCondLst>
+                            <p:childTnLst>
+                              <p:par>
+                                <p:cTn id="15" presetID="1" presetClass="entr" presetSubtype="0" fill="hold" nodeType="clickEffect">
+                                  <p:stCondLst>
+                                    <p:cond delay="0"/>
+                                  </p:stCondLst>
+                                  <p:childTnLst>
+                                    <p:set>
+                                      <p:cBhvr>
+                                        <p:cTn id="16" dur="1" fill="hold">
+                                          <p:stCondLst>
+                                            <p:cond delay="0"/>
+                                          </p:stCondLst>
+                                        </p:cTn>
+                                        <p:tgtEl>
+                                          <p:spTgt spid="4">
+                                            <p:txEl>
+                                              <p:pRg st="0" end="0"/>
+                                            </p:txEl>
+                                          </p:spTgt>
+                                        </p:tgtEl>
+                                        <p:attrNameLst>
+                                          <p:attrName>style.visibility</p:attrName>
+                                        </p:attrNameLst>
+                                      </p:cBhvr>
+                                      <p:to>
+                                        <p:strVal val="visible"/>
+                                      </p:to>
+                                    </p:set>
+                                  </p:childTnLst>
+                                </p:cTn>
+                              </p:par>
+                              <p:par>
+                                <p:cTn id="17" presetID="1" presetClass="entr" presetSubtype="0" fill="hold" nodeType="withEffect">
+                                  <p:stCondLst>
+                                    <p:cond delay="0"/>
+                                  </p:stCondLst>
+                                  <p:childTnLst>
+                                    <p:set>
+                                      <p:cBhvr>
+                                        <p:cTn id="18" dur="1" fill="hold">
+                                          <p:stCondLst>
+                                            <p:cond delay="0"/>
+                                          </p:stCondLst>
+                                        </p:cTn>
+                                        <p:tgtEl>
+                                          <p:spTgt spid="4">
+                                            <p:txEl>
+                                              <p:pRg st="1" end="1"/>
+                                            </p:txEl>
+                                          </p:spTgt>
+                                        </p:tgtEl>
+                                        <p:attrNameLst>
+                                          <p:attrName>style.visibility</p:attrName>
+                                        </p:attrNameLst>
+                                      </p:cBhvr>
+                                      <p:to>
+                                        <p:strVal val="visible"/>
+                                      </p:to>
+                                    </p:set>
+                                  </p:childTnLst>
+                                </p:cTn>
+                              </p:par>
+                              <p:par>
+                                <p:cTn id="19" presetID="1" presetClass="entr" presetSubtype="0" fill="hold" nodeType="withEffect">
+                                  <p:stCondLst>
+                                    <p:cond delay="0"/>
+                                  </p:stCondLst>
+                                  <p:childTnLst>
+                                    <p:set>
+                                      <p:cBhvr>
+                                        <p:cTn id="20" dur="1" fill="hold">
+                                          <p:stCondLst>
+                                            <p:cond delay="0"/>
+                                          </p:stCondLst>
+                                        </p:cTn>
+                                        <p:tgtEl>
+                                          <p:spTgt spid="4">
+                                            <p:txEl>
+                                              <p:pRg st="2" end="2"/>
+                                            </p:txEl>
+                                          </p:spTgt>
+                                        </p:tgtEl>
+                                        <p:attrNameLst>
+                                          <p:attrName>style.visibility</p:attrName>
+                                        </p:attrNameLst>
+                                      </p:cBhvr>
+                                      <p:to>
+                                        <p:strVal val="visible"/>
+                                      </p:to>
+                                    </p:set>
+                                  </p:childTnLst>
+                                </p:cTn>
+                              </p:par>
+                              <p:par>
+                                <p:cTn id="21" presetID="1" presetClass="entr" presetSubtype="0" fill="hold" nodeType="withEffect">
+                                  <p:stCondLst>
+                                    <p:cond delay="0"/>
+                                  </p:stCondLst>
+                                  <p:childTnLst>
+                                    <p:set>
+                                      <p:cBhvr>
+                                        <p:cTn id="22" dur="1" fill="hold">
+                                          <p:stCondLst>
+                                            <p:cond delay="0"/>
+                                          </p:stCondLst>
+                                        </p:cTn>
+                                        <p:tgtEl>
+                                          <p:spTgt spid="4">
+                                            <p:txEl>
+                                              <p:pRg st="3" end="3"/>
+                                            </p:txEl>
+                                          </p:spTgt>
+                                        </p:tgtEl>
+                                        <p:attrNameLst>
+                                          <p:attrName>style.visibility</p:attrName>
+                                        </p:attrNameLst>
+                                      </p:cBhvr>
+                                      <p:to>
+                                        <p:strVal val="visible"/>
+                                      </p:to>
+                                    </p:set>
+                                  </p:childTnLst>
+                                </p:cTn>
+                              </p:par>
+                            </p:childTnLst>
+                          </p:cTn>
+                        </p:par>
+                      </p:childTnLst>
+                    </p:cTn>
+                  </p:par>
+                  <p:par>
+                    <p:cTn id="23" fill="hold">
+                      <p:stCondLst>
+                        <p:cond delay="indefinite"/>
+                      </p:stCondLst>
+                      <p:childTnLst>
+                        <p:par>
+                          <p:cTn id="24" fill="hold">
+                            <p:stCondLst>
+                              <p:cond delay="0"/>
+                            </p:stCondLst>
+                            <p:childTnLst>
+                              <p:par>
+                                <p:cTn id="25" presetID="1" presetClass="entr" presetSubtype="0" fill="hold" nodeType="clickEffect">
+                                  <p:stCondLst>
+                                    <p:cond delay="0"/>
+                                  </p:stCondLst>
+                                  <p:childTnLst>
+                                    <p:set>
+                                      <p:cBhvr>
+                                        <p:cTn id="26" dur="1" fill="hold">
+                                          <p:stCondLst>
+                                            <p:cond delay="0"/>
+                                          </p:stCondLst>
+                                        </p:cTn>
+                                        <p:tgtEl>
+                                          <p:spTgt spid="3">
+                                            <p:txEl>
+                                              <p:pRg st="3" end="3"/>
+                                            </p:txEl>
+                                          </p:spTgt>
+                                        </p:tgtEl>
+                                        <p:attrNameLst>
+                                          <p:attrName>style.visibility</p:attrName>
+                                        </p:attrNameLst>
+                                      </p:cBhvr>
+                                      <p:to>
+                                        <p:strVal val="visible"/>
+                                      </p:to>
+                                    </p:set>
+                                  </p:childTnLst>
+                                </p:cTn>
+                              </p:par>
+                            </p:childTnLst>
+                          </p:cTn>
+                        </p:par>
+                      </p:childTnLst>
+                    </p:cTn>
+                  </p:par>
+                </p:childTnLst>
+              </p:cTn>
+              <p:prevCondLst>
+                <p:cond evt="onPrev" delay="0">
+                  <p:tgtEl>
+                    <p:sldTgt/>
+                  </p:tgtEl>
+                </p:cond>
+              </p:prevCondLst>
+              <p:nextCondLst>
+                <p:cond evt="onNext" delay="0">
+                  <p:tgtEl>
+                    <p:sldTgt/>
+                  </p:tgtEl>
+                </p:cond>
+              </p:nextCondLst>
+            </p:seq>
+          </p:childTnLst>
+        </p:cTn>
+      </p:par>
+    </p:tnLst>
+  </p:timing>
 </p:sld>
 </file>
 
@@ -19018,6 +20314,196 @@
   <p:clrMapOvr>
     <a:masterClrMapping/>
   </p:clrMapOvr>
+  <p:timing>
+    <p:tnLst>
+      <p:par>
+        <p:cTn id="1" dur="indefinite" restart="never" nodeType="tmRoot">
+          <p:childTnLst>
+            <p:seq concurrent="1" nextAc="seek">
+              <p:cTn id="2" dur="indefinite" nodeType="mainSeq">
+                <p:childTnLst>
+                  <p:par>
+                    <p:cTn id="3" fill="hold">
+                      <p:stCondLst>
+                        <p:cond delay="indefinite"/>
+                      </p:stCondLst>
+                      <p:childTnLst>
+                        <p:par>
+                          <p:cTn id="4" fill="hold">
+                            <p:stCondLst>
+                              <p:cond delay="0"/>
+                            </p:stCondLst>
+                            <p:childTnLst>
+                              <p:par>
+                                <p:cTn id="5" presetID="1" presetClass="entr" presetSubtype="0" fill="hold" nodeType="clickEffect">
+                                  <p:stCondLst>
+                                    <p:cond delay="0"/>
+                                  </p:stCondLst>
+                                  <p:childTnLst>
+                                    <p:set>
+                                      <p:cBhvr>
+                                        <p:cTn id="6" dur="1" fill="hold">
+                                          <p:stCondLst>
+                                            <p:cond delay="0"/>
+                                          </p:stCondLst>
+                                        </p:cTn>
+                                        <p:tgtEl>
+                                          <p:spTgt spid="3">
+                                            <p:txEl>
+                                              <p:pRg st="0" end="0"/>
+                                            </p:txEl>
+                                          </p:spTgt>
+                                        </p:tgtEl>
+                                        <p:attrNameLst>
+                                          <p:attrName>style.visibility</p:attrName>
+                                        </p:attrNameLst>
+                                      </p:cBhvr>
+                                      <p:to>
+                                        <p:strVal val="visible"/>
+                                      </p:to>
+                                    </p:set>
+                                  </p:childTnLst>
+                                </p:cTn>
+                              </p:par>
+                              <p:par>
+                                <p:cTn id="7" presetID="1" presetClass="entr" presetSubtype="0" fill="hold" nodeType="withEffect">
+                                  <p:stCondLst>
+                                    <p:cond delay="0"/>
+                                  </p:stCondLst>
+                                  <p:childTnLst>
+                                    <p:set>
+                                      <p:cBhvr>
+                                        <p:cTn id="8" dur="1" fill="hold">
+                                          <p:stCondLst>
+                                            <p:cond delay="0"/>
+                                          </p:stCondLst>
+                                        </p:cTn>
+                                        <p:tgtEl>
+                                          <p:spTgt spid="3">
+                                            <p:txEl>
+                                              <p:pRg st="1" end="1"/>
+                                            </p:txEl>
+                                          </p:spTgt>
+                                        </p:tgtEl>
+                                        <p:attrNameLst>
+                                          <p:attrName>style.visibility</p:attrName>
+                                        </p:attrNameLst>
+                                      </p:cBhvr>
+                                      <p:to>
+                                        <p:strVal val="visible"/>
+                                      </p:to>
+                                    </p:set>
+                                  </p:childTnLst>
+                                </p:cTn>
+                              </p:par>
+                            </p:childTnLst>
+                          </p:cTn>
+                        </p:par>
+                      </p:childTnLst>
+                    </p:cTn>
+                  </p:par>
+                  <p:par>
+                    <p:cTn id="9" fill="hold">
+                      <p:stCondLst>
+                        <p:cond delay="indefinite"/>
+                      </p:stCondLst>
+                      <p:childTnLst>
+                        <p:par>
+                          <p:cTn id="10" fill="hold">
+                            <p:stCondLst>
+                              <p:cond delay="0"/>
+                            </p:stCondLst>
+                            <p:childTnLst>
+                              <p:par>
+                                <p:cTn id="11" presetID="1" presetClass="entr" presetSubtype="0" fill="hold" nodeType="clickEffect">
+                                  <p:stCondLst>
+                                    <p:cond delay="0"/>
+                                  </p:stCondLst>
+                                  <p:childTnLst>
+                                    <p:set>
+                                      <p:cBhvr>
+                                        <p:cTn id="12" dur="1" fill="hold">
+                                          <p:stCondLst>
+                                            <p:cond delay="0"/>
+                                          </p:stCondLst>
+                                        </p:cTn>
+                                        <p:tgtEl>
+                                          <p:spTgt spid="3">
+                                            <p:txEl>
+                                              <p:pRg st="2" end="2"/>
+                                            </p:txEl>
+                                          </p:spTgt>
+                                        </p:tgtEl>
+                                        <p:attrNameLst>
+                                          <p:attrName>style.visibility</p:attrName>
+                                        </p:attrNameLst>
+                                      </p:cBhvr>
+                                      <p:to>
+                                        <p:strVal val="visible"/>
+                                      </p:to>
+                                    </p:set>
+                                  </p:childTnLst>
+                                </p:cTn>
+                              </p:par>
+                              <p:par>
+                                <p:cTn id="13" presetID="1" presetClass="entr" presetSubtype="0" fill="hold" nodeType="withEffect">
+                                  <p:stCondLst>
+                                    <p:cond delay="0"/>
+                                  </p:stCondLst>
+                                  <p:childTnLst>
+                                    <p:set>
+                                      <p:cBhvr>
+                                        <p:cTn id="14" dur="1" fill="hold">
+                                          <p:stCondLst>
+                                            <p:cond delay="0"/>
+                                          </p:stCondLst>
+                                        </p:cTn>
+                                        <p:tgtEl>
+                                          <p:spTgt spid="3">
+                                            <p:txEl>
+                                              <p:pRg st="3" end="3"/>
+                                            </p:txEl>
+                                          </p:spTgt>
+                                        </p:tgtEl>
+                                        <p:attrNameLst>
+                                          <p:attrName>style.visibility</p:attrName>
+                                        </p:attrNameLst>
+                                      </p:cBhvr>
+                                      <p:to>
+                                        <p:strVal val="visible"/>
+                                      </p:to>
+                                    </p:set>
+                                  </p:childTnLst>
+                                </p:cTn>
+                              </p:par>
+                            </p:childTnLst>
+                          </p:cTn>
+                        </p:par>
+                      </p:childTnLst>
+                    </p:cTn>
+                  </p:par>
+                </p:childTnLst>
+              </p:cTn>
+              <p:prevCondLst>
+                <p:cond evt="onPrev" delay="0">
+                  <p:tgtEl>
+                    <p:sldTgt/>
+                  </p:tgtEl>
+                </p:cond>
+              </p:prevCondLst>
+              <p:nextCondLst>
+                <p:cond evt="onNext" delay="0">
+                  <p:tgtEl>
+                    <p:sldTgt/>
+                  </p:tgtEl>
+                </p:cond>
+              </p:nextCondLst>
+            </p:seq>
+          </p:childTnLst>
+        </p:cTn>
+      </p:par>
+    </p:tnLst>
+  </p:timing>
 </p:sld>
 </file>
 
@@ -19725,6 +21211,423 @@
   <p:clrMapOvr>
     <a:masterClrMapping/>
   </p:clrMapOvr>
+  <p:timing>
+    <p:tnLst>
+      <p:par>
+        <p:cTn id="1" dur="indefinite" restart="never" nodeType="tmRoot">
+          <p:childTnLst>
+            <p:seq concurrent="1" nextAc="seek">
+              <p:cTn id="2" dur="indefinite" nodeType="mainSeq">
+                <p:childTnLst>
+                  <p:par>
+                    <p:cTn id="3" fill="hold">
+                      <p:stCondLst>
+                        <p:cond delay="indefinite"/>
+                      </p:stCondLst>
+                      <p:childTnLst>
+                        <p:par>
+                          <p:cTn id="4" fill="hold">
+                            <p:stCondLst>
+                              <p:cond delay="0"/>
+                            </p:stCondLst>
+                            <p:childTnLst>
+                              <p:par>
+                                <p:cTn id="5" presetID="1" presetClass="entr" presetSubtype="0" fill="hold" nodeType="clickEffect">
+                                  <p:stCondLst>
+                                    <p:cond delay="0"/>
+                                  </p:stCondLst>
+                                  <p:childTnLst>
+                                    <p:set>
+                                      <p:cBhvr>
+                                        <p:cTn id="6" dur="1" fill="hold">
+                                          <p:stCondLst>
+                                            <p:cond delay="0"/>
+                                          </p:stCondLst>
+                                        </p:cTn>
+                                        <p:tgtEl>
+                                          <p:spTgt spid="3">
+                                            <p:txEl>
+                                              <p:pRg st="0" end="0"/>
+                                            </p:txEl>
+                                          </p:spTgt>
+                                        </p:tgtEl>
+                                        <p:attrNameLst>
+                                          <p:attrName>style.visibility</p:attrName>
+                                        </p:attrNameLst>
+                                      </p:cBhvr>
+                                      <p:to>
+                                        <p:strVal val="visible"/>
+                                      </p:to>
+                                    </p:set>
+                                  </p:childTnLst>
+                                </p:cTn>
+                              </p:par>
+                            </p:childTnLst>
+                          </p:cTn>
+                        </p:par>
+                      </p:childTnLst>
+                    </p:cTn>
+                  </p:par>
+                  <p:par>
+                    <p:cTn id="7" fill="hold">
+                      <p:stCondLst>
+                        <p:cond delay="indefinite"/>
+                      </p:stCondLst>
+                      <p:childTnLst>
+                        <p:par>
+                          <p:cTn id="8" fill="hold">
+                            <p:stCondLst>
+                              <p:cond delay="0"/>
+                            </p:stCondLst>
+                            <p:childTnLst>
+                              <p:par>
+                                <p:cTn id="9" presetID="1" presetClass="entr" presetSubtype="0" fill="hold" nodeType="clickEffect">
+                                  <p:stCondLst>
+                                    <p:cond delay="0"/>
+                                  </p:stCondLst>
+                                  <p:childTnLst>
+                                    <p:set>
+                                      <p:cBhvr>
+                                        <p:cTn id="10" dur="1" fill="hold">
+                                          <p:stCondLst>
+                                            <p:cond delay="0"/>
+                                          </p:stCondLst>
+                                        </p:cTn>
+                                        <p:tgtEl>
+                                          <p:spTgt spid="4">
+                                            <p:txEl>
+                                              <p:pRg st="0" end="0"/>
+                                            </p:txEl>
+                                          </p:spTgt>
+                                        </p:tgtEl>
+                                        <p:attrNameLst>
+                                          <p:attrName>style.visibility</p:attrName>
+                                        </p:attrNameLst>
+                                      </p:cBhvr>
+                                      <p:to>
+                                        <p:strVal val="visible"/>
+                                      </p:to>
+                                    </p:set>
+                                  </p:childTnLst>
+                                </p:cTn>
+                              </p:par>
+                            </p:childTnLst>
+                          </p:cTn>
+                        </p:par>
+                      </p:childTnLst>
+                    </p:cTn>
+                  </p:par>
+                  <p:par>
+                    <p:cTn id="11" fill="hold">
+                      <p:stCondLst>
+                        <p:cond delay="indefinite"/>
+                      </p:stCondLst>
+                      <p:childTnLst>
+                        <p:par>
+                          <p:cTn id="12" fill="hold">
+                            <p:stCondLst>
+                              <p:cond delay="0"/>
+                            </p:stCondLst>
+                            <p:childTnLst>
+                              <p:par>
+                                <p:cTn id="13" presetID="1" presetClass="entr" presetSubtype="0" fill="hold" nodeType="clickEffect">
+                                  <p:stCondLst>
+                                    <p:cond delay="0"/>
+                                  </p:stCondLst>
+                                  <p:childTnLst>
+                                    <p:set>
+                                      <p:cBhvr>
+                                        <p:cTn id="14" dur="1" fill="hold">
+                                          <p:stCondLst>
+                                            <p:cond delay="0"/>
+                                          </p:stCondLst>
+                                        </p:cTn>
+                                        <p:tgtEl>
+                                          <p:spTgt spid="4">
+                                            <p:txEl>
+                                              <p:pRg st="1" end="1"/>
+                                            </p:txEl>
+                                          </p:spTgt>
+                                        </p:tgtEl>
+                                        <p:attrNameLst>
+                                          <p:attrName>style.visibility</p:attrName>
+                                        </p:attrNameLst>
+                                      </p:cBhvr>
+                                      <p:to>
+                                        <p:strVal val="visible"/>
+                                      </p:to>
+                                    </p:set>
+                                  </p:childTnLst>
+                                </p:cTn>
+                              </p:par>
+                              <p:par>
+                                <p:cTn id="15" presetID="1" presetClass="entr" presetSubtype="0" fill="hold" nodeType="withEffect">
+                                  <p:stCondLst>
+                                    <p:cond delay="0"/>
+                                  </p:stCondLst>
+                                  <p:childTnLst>
+                                    <p:set>
+                                      <p:cBhvr>
+                                        <p:cTn id="16" dur="1" fill="hold">
+                                          <p:stCondLst>
+                                            <p:cond delay="0"/>
+                                          </p:stCondLst>
+                                        </p:cTn>
+                                        <p:tgtEl>
+                                          <p:spTgt spid="4">
+                                            <p:txEl>
+                                              <p:pRg st="2" end="2"/>
+                                            </p:txEl>
+                                          </p:spTgt>
+                                        </p:tgtEl>
+                                        <p:attrNameLst>
+                                          <p:attrName>style.visibility</p:attrName>
+                                        </p:attrNameLst>
+                                      </p:cBhvr>
+                                      <p:to>
+                                        <p:strVal val="visible"/>
+                                      </p:to>
+                                    </p:set>
+                                  </p:childTnLst>
+                                </p:cTn>
+                              </p:par>
+                            </p:childTnLst>
+                          </p:cTn>
+                        </p:par>
+                      </p:childTnLst>
+                    </p:cTn>
+                  </p:par>
+                  <p:par>
+                    <p:cTn id="17" fill="hold">
+                      <p:stCondLst>
+                        <p:cond delay="indefinite"/>
+                      </p:stCondLst>
+                      <p:childTnLst>
+                        <p:par>
+                          <p:cTn id="18" fill="hold">
+                            <p:stCondLst>
+                              <p:cond delay="0"/>
+                            </p:stCondLst>
+                            <p:childTnLst>
+                              <p:par>
+                                <p:cTn id="19" presetID="1" presetClass="entr" presetSubtype="0" fill="hold" nodeType="clickEffect">
+                                  <p:stCondLst>
+                                    <p:cond delay="0"/>
+                                  </p:stCondLst>
+                                  <p:childTnLst>
+                                    <p:set>
+                                      <p:cBhvr>
+                                        <p:cTn id="20" dur="1" fill="hold">
+                                          <p:stCondLst>
+                                            <p:cond delay="0"/>
+                                          </p:stCondLst>
+                                        </p:cTn>
+                                        <p:tgtEl>
+                                          <p:spTgt spid="3">
+                                            <p:txEl>
+                                              <p:pRg st="1" end="1"/>
+                                            </p:txEl>
+                                          </p:spTgt>
+                                        </p:tgtEl>
+                                        <p:attrNameLst>
+                                          <p:attrName>style.visibility</p:attrName>
+                                        </p:attrNameLst>
+                                      </p:cBhvr>
+                                      <p:to>
+                                        <p:strVal val="visible"/>
+                                      </p:to>
+                                    </p:set>
+                                  </p:childTnLst>
+                                </p:cTn>
+                              </p:par>
+                            </p:childTnLst>
+                          </p:cTn>
+                        </p:par>
+                      </p:childTnLst>
+                    </p:cTn>
+                  </p:par>
+                  <p:par>
+                    <p:cTn id="21" fill="hold">
+                      <p:stCondLst>
+                        <p:cond delay="indefinite"/>
+                      </p:stCondLst>
+                      <p:childTnLst>
+                        <p:par>
+                          <p:cTn id="22" fill="hold">
+                            <p:stCondLst>
+                              <p:cond delay="0"/>
+                            </p:stCondLst>
+                            <p:childTnLst>
+                              <p:par>
+                                <p:cTn id="23" presetID="1" presetClass="entr" presetSubtype="0" fill="hold" nodeType="clickEffect">
+                                  <p:stCondLst>
+                                    <p:cond delay="0"/>
+                                  </p:stCondLst>
+                                  <p:childTnLst>
+                                    <p:set>
+                                      <p:cBhvr>
+                                        <p:cTn id="24" dur="1" fill="hold">
+                                          <p:stCondLst>
+                                            <p:cond delay="0"/>
+                                          </p:stCondLst>
+                                        </p:cTn>
+                                        <p:tgtEl>
+                                          <p:spTgt spid="4">
+                                            <p:txEl>
+                                              <p:pRg st="4" end="4"/>
+                                            </p:txEl>
+                                          </p:spTgt>
+                                        </p:tgtEl>
+                                        <p:attrNameLst>
+                                          <p:attrName>style.visibility</p:attrName>
+                                        </p:attrNameLst>
+                                      </p:cBhvr>
+                                      <p:to>
+                                        <p:strVal val="visible"/>
+                                      </p:to>
+                                    </p:set>
+                                  </p:childTnLst>
+                                </p:cTn>
+                              </p:par>
+                              <p:par>
+                                <p:cTn id="25" presetID="1" presetClass="entr" presetSubtype="0" fill="hold" nodeType="withEffect">
+                                  <p:stCondLst>
+                                    <p:cond delay="0"/>
+                                  </p:stCondLst>
+                                  <p:childTnLst>
+                                    <p:set>
+                                      <p:cBhvr>
+                                        <p:cTn id="26" dur="1" fill="hold">
+                                          <p:stCondLst>
+                                            <p:cond delay="0"/>
+                                          </p:stCondLst>
+                                        </p:cTn>
+                                        <p:tgtEl>
+                                          <p:spTgt spid="4">
+                                            <p:txEl>
+                                              <p:pRg st="5" end="5"/>
+                                            </p:txEl>
+                                          </p:spTgt>
+                                        </p:tgtEl>
+                                        <p:attrNameLst>
+                                          <p:attrName>style.visibility</p:attrName>
+                                        </p:attrNameLst>
+                                      </p:cBhvr>
+                                      <p:to>
+                                        <p:strVal val="visible"/>
+                                      </p:to>
+                                    </p:set>
+                                  </p:childTnLst>
+                                </p:cTn>
+                              </p:par>
+                              <p:par>
+                                <p:cTn id="27" presetID="1" presetClass="entr" presetSubtype="0" fill="hold" nodeType="withEffect">
+                                  <p:stCondLst>
+                                    <p:cond delay="0"/>
+                                  </p:stCondLst>
+                                  <p:childTnLst>
+                                    <p:set>
+                                      <p:cBhvr>
+                                        <p:cTn id="28" dur="1" fill="hold">
+                                          <p:stCondLst>
+                                            <p:cond delay="0"/>
+                                          </p:stCondLst>
+                                        </p:cTn>
+                                        <p:tgtEl>
+                                          <p:spTgt spid="4">
+                                            <p:txEl>
+                                              <p:pRg st="6" end="6"/>
+                                            </p:txEl>
+                                          </p:spTgt>
+                                        </p:tgtEl>
+                                        <p:attrNameLst>
+                                          <p:attrName>style.visibility</p:attrName>
+                                        </p:attrNameLst>
+                                      </p:cBhvr>
+                                      <p:to>
+                                        <p:strVal val="visible"/>
+                                      </p:to>
+                                    </p:set>
+                                  </p:childTnLst>
+                                </p:cTn>
+                              </p:par>
+                            </p:childTnLst>
+                          </p:cTn>
+                        </p:par>
+                      </p:childTnLst>
+                    </p:cTn>
+                  </p:par>
+                  <p:par>
+                    <p:cTn id="29" fill="hold">
+                      <p:stCondLst>
+                        <p:cond delay="indefinite"/>
+                      </p:stCondLst>
+                      <p:childTnLst>
+                        <p:par>
+                          <p:cTn id="30" fill="hold">
+                            <p:stCondLst>
+                              <p:cond delay="0"/>
+                            </p:stCondLst>
+                            <p:childTnLst>
+                              <p:par>
+                                <p:cTn id="31" presetID="1" presetClass="entr" presetSubtype="0" fill="hold" nodeType="clickEffect">
+                                  <p:stCondLst>
+                                    <p:cond delay="0"/>
+                                  </p:stCondLst>
+                                  <p:childTnLst>
+                                    <p:set>
+                                      <p:cBhvr>
+                                        <p:cTn id="32" dur="1" fill="hold">
+                                          <p:stCondLst>
+                                            <p:cond delay="0"/>
+                                          </p:stCondLst>
+                                        </p:cTn>
+                                        <p:tgtEl>
+                                          <p:spTgt spid="3">
+                                            <p:txEl>
+                                              <p:pRg st="2" end="2"/>
+                                            </p:txEl>
+                                          </p:spTgt>
+                                        </p:tgtEl>
+                                        <p:attrNameLst>
+                                          <p:attrName>style.visibility</p:attrName>
+                                        </p:attrNameLst>
+                                      </p:cBhvr>
+                                      <p:to>
+                                        <p:strVal val="visible"/>
+                                      </p:to>
+                                    </p:set>
+                                  </p:childTnLst>
+                                </p:cTn>
+                              </p:par>
+                            </p:childTnLst>
+                          </p:cTn>
+                        </p:par>
+                      </p:childTnLst>
+                    </p:cTn>
+                  </p:par>
+                </p:childTnLst>
+              </p:cTn>
+              <p:prevCondLst>
+                <p:cond evt="onPrev" delay="0">
+                  <p:tgtEl>
+                    <p:sldTgt/>
+                  </p:tgtEl>
+                </p:cond>
+              </p:prevCondLst>
+              <p:nextCondLst>
+                <p:cond evt="onNext" delay="0">
+                  <p:tgtEl>
+                    <p:sldTgt/>
+                  </p:tgtEl>
+                </p:cond>
+              </p:nextCondLst>
+            </p:seq>
+          </p:childTnLst>
+        </p:cTn>
+      </p:par>
+    </p:tnLst>
+  </p:timing>
 </p:sld>
 </file>
 
@@ -20290,33 +22193,15 @@
                                   </p:childTnLst>
                                 </p:cTn>
                               </p:par>
-                            </p:childTnLst>
-                          </p:cTn>
-                        </p:par>
-                      </p:childTnLst>
-                    </p:cTn>
-                  </p:par>
-                  <p:par>
-                    <p:cTn id="15" fill="hold">
-                      <p:stCondLst>
-                        <p:cond delay="indefinite"/>
-                      </p:stCondLst>
-                      <p:childTnLst>
-                        <p:par>
-                          <p:cTn id="16" fill="hold">
-                            <p:stCondLst>
-                              <p:cond delay="0"/>
-                            </p:stCondLst>
-                            <p:childTnLst>
                               <p:par>
-                                <p:cTn id="17" presetID="1" presetClass="entr" presetSubtype="0" fill="hold" nodeType="clickEffect">
+                                <p:cTn id="15" presetID="1" presetClass="entr" presetSubtype="0" fill="hold" nodeType="withEffect">
                                   <p:stCondLst>
                                     <p:cond delay="0"/>
                                   </p:stCondLst>
                                   <p:childTnLst>
                                     <p:set>
                                       <p:cBhvr>
-                                        <p:cTn id="18" dur="1" fill="hold">
+                                        <p:cTn id="16" dur="1" fill="hold">
                                           <p:stCondLst>
                                             <p:cond delay="0"/>
                                           </p:stCondLst>
@@ -20346,26 +22231,26 @@
                     </p:cTn>
                   </p:par>
                   <p:par>
-                    <p:cTn id="19" fill="hold">
+                    <p:cTn id="17" fill="hold">
                       <p:stCondLst>
                         <p:cond delay="indefinite"/>
                       </p:stCondLst>
                       <p:childTnLst>
                         <p:par>
-                          <p:cTn id="20" fill="hold">
+                          <p:cTn id="18" fill="hold">
                             <p:stCondLst>
                               <p:cond delay="0"/>
                             </p:stCondLst>
                             <p:childTnLst>
                               <p:par>
-                                <p:cTn id="21" presetID="1" presetClass="entr" presetSubtype="0" fill="hold" nodeType="clickEffect">
+                                <p:cTn id="19" presetID="1" presetClass="entr" presetSubtype="0" fill="hold" nodeType="clickEffect">
                                   <p:stCondLst>
                                     <p:cond delay="0"/>
                                   </p:stCondLst>
                                   <p:childTnLst>
                                     <p:set>
                                       <p:cBhvr>
-                                        <p:cTn id="22" dur="1" fill="hold">
+                                        <p:cTn id="20" dur="1" fill="hold">
                                           <p:stCondLst>
                                             <p:cond delay="0"/>
                                           </p:stCondLst>
@@ -20395,19 +22280,50 @@
                     </p:cTn>
                   </p:par>
                   <p:par>
-                    <p:cTn id="23" fill="hold">
+                    <p:cTn id="21" fill="hold">
                       <p:stCondLst>
                         <p:cond delay="indefinite"/>
                       </p:stCondLst>
                       <p:childTnLst>
                         <p:par>
-                          <p:cTn id="24" fill="hold">
+                          <p:cTn id="22" fill="hold">
                             <p:stCondLst>
                               <p:cond delay="0"/>
                             </p:stCondLst>
                             <p:childTnLst>
                               <p:par>
-                                <p:cTn id="25" presetID="1" presetClass="entr" presetSubtype="0" fill="hold" nodeType="clickEffect">
+                                <p:cTn id="23" presetID="1" presetClass="entr" presetSubtype="0" fill="hold" nodeType="clickEffect">
+                                  <p:stCondLst>
+                                    <p:cond delay="0"/>
+                                  </p:stCondLst>
+                                  <p:childTnLst>
+                                    <p:set>
+                                      <p:cBhvr>
+                                        <p:cTn id="24" dur="1" fill="hold">
+                                          <p:stCondLst>
+                                            <p:cond delay="0"/>
+                                          </p:stCondLst>
+                                        </p:cTn>
+                                        <p:tgtEl>
+                                          <p:spTgt spid="3">
+                                            <p:txEl>
+                                              <p:pRg st="5" end="5"/>
+                                            </p:txEl>
+                                          </p:spTgt>
+                                        </p:tgtEl>
+                                        <p:attrNameLst>
+                                          <p:attrName>style.visibility</p:attrName>
+                                        </p:attrNameLst>
+                                      </p:cBhvr>
+                                      <p:to>
+                                        <p:strVal val="visible"/>
+                                      </p:to>
+                                    </p:set>
+                                  </p:childTnLst>
+                                </p:cTn>
+                              </p:par>
+                              <p:par>
+                                <p:cTn id="25" presetID="1" presetClass="entr" presetSubtype="0" fill="hold" nodeType="withEffect">
                                   <p:stCondLst>
                                     <p:cond delay="0"/>
                                   </p:stCondLst>
@@ -20422,7 +22338,7 @@
                                         <p:tgtEl>
                                           <p:spTgt spid="3">
                                             <p:txEl>
-                                              <p:pRg st="5" end="5"/>
+                                              <p:pRg st="6" end="6"/>
                                             </p:txEl>
                                           </p:spTgt>
                                         </p:tgtEl>
@@ -20471,7 +22387,7 @@
                                         <p:tgtEl>
                                           <p:spTgt spid="3">
                                             <p:txEl>
-                                              <p:pRg st="6" end="6"/>
+                                              <p:pRg st="7" end="7"/>
                                             </p:txEl>
                                           </p:spTgt>
                                         </p:tgtEl>
@@ -20520,7 +22436,7 @@
                                         <p:tgtEl>
                                           <p:spTgt spid="3">
                                             <p:txEl>
-                                              <p:pRg st="7" end="7"/>
+                                              <p:pRg st="8" end="8"/>
                                             </p:txEl>
                                           </p:spTgt>
                                         </p:tgtEl>
@@ -20569,7 +22485,7 @@
                                         <p:tgtEl>
                                           <p:spTgt spid="3">
                                             <p:txEl>
-                                              <p:pRg st="8" end="8"/>
+                                              <p:pRg st="9" end="9"/>
                                             </p:txEl>
                                           </p:spTgt>
                                         </p:tgtEl>
@@ -20616,9 +22532,9 @@
                                           </p:stCondLst>
                                         </p:cTn>
                                         <p:tgtEl>
-                                          <p:spTgt spid="3">
+                                          <p:spTgt spid="7">
                                             <p:txEl>
-                                              <p:pRg st="9" end="9"/>
+                                              <p:pRg st="0" end="0"/>
                                             </p:txEl>
                                           </p:spTgt>
                                         </p:tgtEl>
@@ -20633,26 +22549,39 @@
                                   </p:childTnLst>
                                 </p:cTn>
                               </p:par>
-                            </p:childTnLst>
-                          </p:cTn>
-                        </p:par>
-                      </p:childTnLst>
-                    </p:cTn>
-                  </p:par>
-                  <p:par>
-                    <p:cTn id="43" fill="hold">
-                      <p:stCondLst>
-                        <p:cond delay="indefinite"/>
-                      </p:stCondLst>
-                      <p:childTnLst>
-                        <p:par>
-                          <p:cTn id="44" fill="hold">
-                            <p:stCondLst>
-                              <p:cond delay="0"/>
-                            </p:stCondLst>
-                            <p:childTnLst>
                               <p:par>
-                                <p:cTn id="45" presetID="1" presetClass="entr" presetSubtype="0" fill="hold" nodeType="clickEffect">
+                                <p:cTn id="43" presetID="1" presetClass="entr" presetSubtype="0" fill="hold" nodeType="withEffect">
+                                  <p:stCondLst>
+                                    <p:cond delay="0"/>
+                                  </p:stCondLst>
+                                  <p:childTnLst>
+                                    <p:set>
+                                      <p:cBhvr>
+                                        <p:cTn id="44" dur="1" fill="hold">
+                                          <p:stCondLst>
+                                            <p:cond delay="0"/>
+                                          </p:stCondLst>
+                                        </p:cTn>
+                                        <p:tgtEl>
+                                          <p:spTgt spid="7">
+                                            <p:txEl>
+                                              <p:pRg st="1" end="1"/>
+                                            </p:txEl>
+                                          </p:spTgt>
+                                        </p:tgtEl>
+                                        <p:attrNameLst>
+                                          <p:attrName>style.visibility</p:attrName>
+                                        </p:attrNameLst>
+                                      </p:cBhvr>
+                                      <p:to>
+                                        <p:strVal val="visible"/>
+                                      </p:to>
+                                    </p:set>
+                                  </p:childTnLst>
+                                </p:cTn>
+                              </p:par>
+                              <p:par>
+                                <p:cTn id="45" presetID="1" presetClass="entr" presetSubtype="0" fill="hold" nodeType="withEffect">
                                   <p:stCondLst>
                                     <p:cond delay="0"/>
                                   </p:stCondLst>
@@ -20667,7 +22596,7 @@
                                         <p:tgtEl>
                                           <p:spTgt spid="7">
                                             <p:txEl>
-                                              <p:pRg st="0" end="0"/>
+                                              <p:pRg st="2" end="2"/>
                                             </p:txEl>
                                           </p:spTgt>
                                         </p:tgtEl>
@@ -20698,7 +22627,7 @@
                                         <p:tgtEl>
                                           <p:spTgt spid="7">
                                             <p:txEl>
-                                              <p:pRg st="1" end="1"/>
+                                              <p:pRg st="3" end="3"/>
                                             </p:txEl>
                                           </p:spTgt>
                                         </p:tgtEl>
@@ -20729,68 +22658,6 @@
                                         <p:tgtEl>
                                           <p:spTgt spid="7">
                                             <p:txEl>
-                                              <p:pRg st="2" end="2"/>
-                                            </p:txEl>
-                                          </p:spTgt>
-                                        </p:tgtEl>
-                                        <p:attrNameLst>
-                                          <p:attrName>style.visibility</p:attrName>
-                                        </p:attrNameLst>
-                                      </p:cBhvr>
-                                      <p:to>
-                                        <p:strVal val="visible"/>
-                                      </p:to>
-                                    </p:set>
-                                  </p:childTnLst>
-                                </p:cTn>
-                              </p:par>
-                              <p:par>
-                                <p:cTn id="51" presetID="1" presetClass="entr" presetSubtype="0" fill="hold" nodeType="withEffect">
-                                  <p:stCondLst>
-                                    <p:cond delay="0"/>
-                                  </p:stCondLst>
-                                  <p:childTnLst>
-                                    <p:set>
-                                      <p:cBhvr>
-                                        <p:cTn id="52" dur="1" fill="hold">
-                                          <p:stCondLst>
-                                            <p:cond delay="0"/>
-                                          </p:stCondLst>
-                                        </p:cTn>
-                                        <p:tgtEl>
-                                          <p:spTgt spid="7">
-                                            <p:txEl>
-                                              <p:pRg st="3" end="3"/>
-                                            </p:txEl>
-                                          </p:spTgt>
-                                        </p:tgtEl>
-                                        <p:attrNameLst>
-                                          <p:attrName>style.visibility</p:attrName>
-                                        </p:attrNameLst>
-                                      </p:cBhvr>
-                                      <p:to>
-                                        <p:strVal val="visible"/>
-                                      </p:to>
-                                    </p:set>
-                                  </p:childTnLst>
-                                </p:cTn>
-                              </p:par>
-                              <p:par>
-                                <p:cTn id="53" presetID="1" presetClass="entr" presetSubtype="0" fill="hold" nodeType="withEffect">
-                                  <p:stCondLst>
-                                    <p:cond delay="0"/>
-                                  </p:stCondLst>
-                                  <p:childTnLst>
-                                    <p:set>
-                                      <p:cBhvr>
-                                        <p:cTn id="54" dur="1" fill="hold">
-                                          <p:stCondLst>
-                                            <p:cond delay="0"/>
-                                          </p:stCondLst>
-                                        </p:cTn>
-                                        <p:tgtEl>
-                                          <p:spTgt spid="7">
-                                            <p:txEl>
                                               <p:pRg st="4" end="4"/>
                                             </p:txEl>
                                           </p:spTgt>
@@ -20806,15 +22673,33 @@
                                   </p:childTnLst>
                                 </p:cTn>
                               </p:par>
+                            </p:childTnLst>
+                          </p:cTn>
+                        </p:par>
+                      </p:childTnLst>
+                    </p:cTn>
+                  </p:par>
+                  <p:par>
+                    <p:cTn id="51" fill="hold">
+                      <p:stCondLst>
+                        <p:cond delay="indefinite"/>
+                      </p:stCondLst>
+                      <p:childTnLst>
+                        <p:par>
+                          <p:cTn id="52" fill="hold">
+                            <p:stCondLst>
+                              <p:cond delay="0"/>
+                            </p:stCondLst>
+                            <p:childTnLst>
                               <p:par>
-                                <p:cTn id="55" presetID="1" presetClass="entr" presetSubtype="0" fill="hold" nodeType="withEffect">
+                                <p:cTn id="53" presetID="1" presetClass="entr" presetSubtype="0" fill="hold" nodeType="clickEffect">
                                   <p:stCondLst>
                                     <p:cond delay="0"/>
                                   </p:stCondLst>
                                   <p:childTnLst>
                                     <p:set>
                                       <p:cBhvr>
-                                        <p:cTn id="56" dur="1" fill="hold">
+                                        <p:cTn id="54" dur="1" fill="hold">
                                           <p:stCondLst>
                                             <p:cond delay="0"/>
                                           </p:stCondLst>
@@ -20844,26 +22729,26 @@
                     </p:cTn>
                   </p:par>
                   <p:par>
-                    <p:cTn id="57" fill="hold">
+                    <p:cTn id="55" fill="hold">
                       <p:stCondLst>
                         <p:cond delay="indefinite"/>
                       </p:stCondLst>
                       <p:childTnLst>
                         <p:par>
-                          <p:cTn id="58" fill="hold">
+                          <p:cTn id="56" fill="hold">
                             <p:stCondLst>
                               <p:cond delay="0"/>
                             </p:stCondLst>
                             <p:childTnLst>
                               <p:par>
-                                <p:cTn id="59" presetID="1" presetClass="entr" presetSubtype="0" fill="hold" nodeType="clickEffect">
+                                <p:cTn id="57" presetID="1" presetClass="entr" presetSubtype="0" fill="hold" nodeType="clickEffect">
                                   <p:stCondLst>
                                     <p:cond delay="0"/>
                                   </p:stCondLst>
                                   <p:childTnLst>
                                     <p:set>
                                       <p:cBhvr>
-                                        <p:cTn id="60" dur="1" fill="hold">
+                                        <p:cTn id="58" dur="1" fill="hold">
                                           <p:stCondLst>
                                             <p:cond delay="0"/>
                                           </p:stCondLst>

</xml_diff>